<commit_message>
minor edit to final prez
</commit_message>
<xml_diff>
--- a/final_presentation.pptx
+++ b/final_presentation.pptx
@@ -20663,6 +20663,10 @@
           <a:bodyPr/>
           <a:lstStyle/>
           <a:p>
+            <a:pPr marL="342900" indent="-342900">
+              <a:buFont typeface="Arial" panose="020B0604020202020204" pitchFamily="34" charset="0"/>
+              <a:buChar char="•"/>
+            </a:pPr>
             <a:r>
               <a:rPr lang="en-US" sz="2400" spc="-1" dirty="0">
                 <a:solidFill>
@@ -20692,6 +20696,10 @@
             </a:r>
           </a:p>
           <a:p>
+            <a:pPr marL="342900" indent="-342900">
+              <a:buFont typeface="Arial" panose="020B0604020202020204" pitchFamily="34" charset="0"/>
+              <a:buChar char="•"/>
+            </a:pPr>
             <a:r>
               <a:rPr lang="en-US" sz="2400" spc="-1" dirty="0">
                 <a:solidFill>
@@ -20703,6 +20711,10 @@
             </a:r>
           </a:p>
           <a:p>
+            <a:pPr marL="342900" indent="-342900">
+              <a:buFont typeface="Arial" panose="020B0604020202020204" pitchFamily="34" charset="0"/>
+              <a:buChar char="•"/>
+            </a:pPr>
             <a:r>
               <a:rPr lang="en-US" sz="2400" spc="-1" dirty="0">
                 <a:solidFill>
@@ -20714,6 +20726,10 @@
             </a:r>
           </a:p>
           <a:p>
+            <a:pPr marL="342900" indent="-342900">
+              <a:buFont typeface="Arial" panose="020B0604020202020204" pitchFamily="34" charset="0"/>
+              <a:buChar char="•"/>
+            </a:pPr>
             <a:r>
               <a:rPr lang="en-US" sz="2400" spc="-1" dirty="0">
                 <a:solidFill>
@@ -20723,9 +20739,6 @@
               </a:rPr>
               <a:t>Use AUC (Area Under the ROC Curve) to evaluate predictions</a:t>
             </a:r>
-          </a:p>
-          <a:p>
-            <a:endParaRPr lang="en-US" dirty="0"/>
           </a:p>
         </p:txBody>
       </p:sp>

</xml_diff>

<commit_message>
fixed final presentation bullet points, added animations
</commit_message>
<xml_diff>
--- a/final_presentation.pptx
+++ b/final_presentation.pptx
@@ -23648,6 +23648,284 @@
   <p:clrMapOvr>
     <a:masterClrMapping/>
   </p:clrMapOvr>
+  <p:timing>
+    <p:tnLst>
+      <p:par>
+        <p:cTn id="1" dur="indefinite" restart="never" nodeType="tmRoot">
+          <p:childTnLst>
+            <p:seq concurrent="1" nextAc="seek">
+              <p:cTn id="2" dur="indefinite" nodeType="mainSeq">
+                <p:childTnLst>
+                  <p:par>
+                    <p:cTn id="3" fill="hold">
+                      <p:stCondLst>
+                        <p:cond delay="indefinite"/>
+                      </p:stCondLst>
+                      <p:childTnLst>
+                        <p:par>
+                          <p:cTn id="4" fill="hold">
+                            <p:stCondLst>
+                              <p:cond delay="0"/>
+                            </p:stCondLst>
+                            <p:childTnLst>
+                              <p:par>
+                                <p:cTn id="5" presetID="1" presetClass="entr" presetSubtype="0" fill="hold" grpId="0" nodeType="clickEffect">
+                                  <p:stCondLst>
+                                    <p:cond delay="0"/>
+                                  </p:stCondLst>
+                                  <p:childTnLst>
+                                    <p:set>
+                                      <p:cBhvr>
+                                        <p:cTn id="6" dur="1" fill="hold">
+                                          <p:stCondLst>
+                                            <p:cond delay="0"/>
+                                          </p:stCondLst>
+                                        </p:cTn>
+                                        <p:tgtEl>
+                                          <p:spTgt spid="12">
+                                            <p:txEl>
+                                              <p:pRg st="0" end="0"/>
+                                            </p:txEl>
+                                          </p:spTgt>
+                                        </p:tgtEl>
+                                        <p:attrNameLst>
+                                          <p:attrName>style.visibility</p:attrName>
+                                        </p:attrNameLst>
+                                      </p:cBhvr>
+                                      <p:to>
+                                        <p:strVal val="visible"/>
+                                      </p:to>
+                                    </p:set>
+                                  </p:childTnLst>
+                                </p:cTn>
+                              </p:par>
+                            </p:childTnLst>
+                          </p:cTn>
+                        </p:par>
+                      </p:childTnLst>
+                    </p:cTn>
+                  </p:par>
+                  <p:par>
+                    <p:cTn id="7" fill="hold">
+                      <p:stCondLst>
+                        <p:cond delay="indefinite"/>
+                      </p:stCondLst>
+                      <p:childTnLst>
+                        <p:par>
+                          <p:cTn id="8" fill="hold">
+                            <p:stCondLst>
+                              <p:cond delay="0"/>
+                            </p:stCondLst>
+                            <p:childTnLst>
+                              <p:par>
+                                <p:cTn id="9" presetID="1" presetClass="entr" presetSubtype="0" fill="hold" grpId="0" nodeType="clickEffect">
+                                  <p:stCondLst>
+                                    <p:cond delay="0"/>
+                                  </p:stCondLst>
+                                  <p:childTnLst>
+                                    <p:set>
+                                      <p:cBhvr>
+                                        <p:cTn id="10" dur="1" fill="hold">
+                                          <p:stCondLst>
+                                            <p:cond delay="0"/>
+                                          </p:stCondLst>
+                                        </p:cTn>
+                                        <p:tgtEl>
+                                          <p:spTgt spid="12">
+                                            <p:txEl>
+                                              <p:pRg st="1" end="1"/>
+                                            </p:txEl>
+                                          </p:spTgt>
+                                        </p:tgtEl>
+                                        <p:attrNameLst>
+                                          <p:attrName>style.visibility</p:attrName>
+                                        </p:attrNameLst>
+                                      </p:cBhvr>
+                                      <p:to>
+                                        <p:strVal val="visible"/>
+                                      </p:to>
+                                    </p:set>
+                                  </p:childTnLst>
+                                </p:cTn>
+                              </p:par>
+                            </p:childTnLst>
+                          </p:cTn>
+                        </p:par>
+                      </p:childTnLst>
+                    </p:cTn>
+                  </p:par>
+                  <p:par>
+                    <p:cTn id="11" fill="hold">
+                      <p:stCondLst>
+                        <p:cond delay="indefinite"/>
+                      </p:stCondLst>
+                      <p:childTnLst>
+                        <p:par>
+                          <p:cTn id="12" fill="hold">
+                            <p:stCondLst>
+                              <p:cond delay="0"/>
+                            </p:stCondLst>
+                            <p:childTnLst>
+                              <p:par>
+                                <p:cTn id="13" presetID="1" presetClass="entr" presetSubtype="0" fill="hold" grpId="0" nodeType="clickEffect">
+                                  <p:stCondLst>
+                                    <p:cond delay="0"/>
+                                  </p:stCondLst>
+                                  <p:childTnLst>
+                                    <p:set>
+                                      <p:cBhvr>
+                                        <p:cTn id="14" dur="1" fill="hold">
+                                          <p:stCondLst>
+                                            <p:cond delay="0"/>
+                                          </p:stCondLst>
+                                        </p:cTn>
+                                        <p:tgtEl>
+                                          <p:spTgt spid="12">
+                                            <p:txEl>
+                                              <p:pRg st="2" end="2"/>
+                                            </p:txEl>
+                                          </p:spTgt>
+                                        </p:tgtEl>
+                                        <p:attrNameLst>
+                                          <p:attrName>style.visibility</p:attrName>
+                                        </p:attrNameLst>
+                                      </p:cBhvr>
+                                      <p:to>
+                                        <p:strVal val="visible"/>
+                                      </p:to>
+                                    </p:set>
+                                  </p:childTnLst>
+                                </p:cTn>
+                              </p:par>
+                            </p:childTnLst>
+                          </p:cTn>
+                        </p:par>
+                      </p:childTnLst>
+                    </p:cTn>
+                  </p:par>
+                  <p:par>
+                    <p:cTn id="15" fill="hold">
+                      <p:stCondLst>
+                        <p:cond delay="indefinite"/>
+                      </p:stCondLst>
+                      <p:childTnLst>
+                        <p:par>
+                          <p:cTn id="16" fill="hold">
+                            <p:stCondLst>
+                              <p:cond delay="0"/>
+                            </p:stCondLst>
+                            <p:childTnLst>
+                              <p:par>
+                                <p:cTn id="17" presetID="1" presetClass="entr" presetSubtype="0" fill="hold" grpId="0" nodeType="clickEffect">
+                                  <p:stCondLst>
+                                    <p:cond delay="0"/>
+                                  </p:stCondLst>
+                                  <p:childTnLst>
+                                    <p:set>
+                                      <p:cBhvr>
+                                        <p:cTn id="18" dur="1" fill="hold">
+                                          <p:stCondLst>
+                                            <p:cond delay="0"/>
+                                          </p:stCondLst>
+                                        </p:cTn>
+                                        <p:tgtEl>
+                                          <p:spTgt spid="12">
+                                            <p:txEl>
+                                              <p:pRg st="3" end="3"/>
+                                            </p:txEl>
+                                          </p:spTgt>
+                                        </p:tgtEl>
+                                        <p:attrNameLst>
+                                          <p:attrName>style.visibility</p:attrName>
+                                        </p:attrNameLst>
+                                      </p:cBhvr>
+                                      <p:to>
+                                        <p:strVal val="visible"/>
+                                      </p:to>
+                                    </p:set>
+                                  </p:childTnLst>
+                                </p:cTn>
+                              </p:par>
+                            </p:childTnLst>
+                          </p:cTn>
+                        </p:par>
+                      </p:childTnLst>
+                    </p:cTn>
+                  </p:par>
+                  <p:par>
+                    <p:cTn id="19" fill="hold">
+                      <p:stCondLst>
+                        <p:cond delay="indefinite"/>
+                      </p:stCondLst>
+                      <p:childTnLst>
+                        <p:par>
+                          <p:cTn id="20" fill="hold">
+                            <p:stCondLst>
+                              <p:cond delay="0"/>
+                            </p:stCondLst>
+                            <p:childTnLst>
+                              <p:par>
+                                <p:cTn id="21" presetID="1" presetClass="entr" presetSubtype="0" fill="hold" grpId="0" nodeType="clickEffect">
+                                  <p:stCondLst>
+                                    <p:cond delay="0"/>
+                                  </p:stCondLst>
+                                  <p:childTnLst>
+                                    <p:set>
+                                      <p:cBhvr>
+                                        <p:cTn id="22" dur="1" fill="hold">
+                                          <p:stCondLst>
+                                            <p:cond delay="0"/>
+                                          </p:stCondLst>
+                                        </p:cTn>
+                                        <p:tgtEl>
+                                          <p:spTgt spid="12">
+                                            <p:txEl>
+                                              <p:pRg st="4" end="4"/>
+                                            </p:txEl>
+                                          </p:spTgt>
+                                        </p:tgtEl>
+                                        <p:attrNameLst>
+                                          <p:attrName>style.visibility</p:attrName>
+                                        </p:attrNameLst>
+                                      </p:cBhvr>
+                                      <p:to>
+                                        <p:strVal val="visible"/>
+                                      </p:to>
+                                    </p:set>
+                                  </p:childTnLst>
+                                </p:cTn>
+                              </p:par>
+                            </p:childTnLst>
+                          </p:cTn>
+                        </p:par>
+                      </p:childTnLst>
+                    </p:cTn>
+                  </p:par>
+                </p:childTnLst>
+              </p:cTn>
+              <p:prevCondLst>
+                <p:cond evt="onPrev" delay="0">
+                  <p:tgtEl>
+                    <p:sldTgt/>
+                  </p:tgtEl>
+                </p:cond>
+              </p:prevCondLst>
+              <p:nextCondLst>
+                <p:cond evt="onNext" delay="0">
+                  <p:tgtEl>
+                    <p:sldTgt/>
+                  </p:tgtEl>
+                </p:cond>
+              </p:nextCondLst>
+            </p:seq>
+          </p:childTnLst>
+        </p:cTn>
+      </p:par>
+    </p:tnLst>
+    <p:bldLst>
+      <p:bldP spid="12" grpId="0" build="p"/>
+    </p:bldLst>
+  </p:timing>
 </p:sld>
 </file>
 
@@ -27327,42 +27605,88 @@
         </p:nvSpPr>
         <p:spPr>
           <a:xfrm>
-            <a:off x="504000" y="1326600"/>
-            <a:ext cx="4898179" cy="3288600"/>
+            <a:off x="381838" y="1326599"/>
+            <a:ext cx="5020342" cy="3456415"/>
           </a:xfrm>
         </p:spPr>
         <p:txBody>
           <a:bodyPr/>
           <a:lstStyle/>
           <a:p>
+            <a:pPr marL="342900" indent="-342900">
+              <a:buFont typeface="Arial" panose="020B0604020202020204" pitchFamily="34" charset="0"/>
+              <a:buChar char="•"/>
+            </a:pPr>
             <a:r>
-              <a:rPr lang="en-US" sz="2400" dirty="0"/>
+              <a:rPr lang="en-US" sz="2400" spc="-1" dirty="0">
+                <a:solidFill>
+                  <a:srgbClr val="808080"/>
+                </a:solidFill>
+                <a:latin typeface="Noto Sans"/>
+              </a:rPr>
               <a:t>Analyzed and cleaned large dataset</a:t>
             </a:r>
           </a:p>
           <a:p>
+            <a:pPr marL="342900" indent="-342900">
+              <a:buFont typeface="Arial" panose="020B0604020202020204" pitchFamily="34" charset="0"/>
+              <a:buChar char="•"/>
+            </a:pPr>
             <a:r>
-              <a:rPr lang="en-US" sz="2400" dirty="0"/>
+              <a:rPr lang="en-US" sz="2400" spc="-1" dirty="0">
+                <a:solidFill>
+                  <a:srgbClr val="808080"/>
+                </a:solidFill>
+                <a:latin typeface="Noto Sans"/>
+              </a:rPr>
               <a:t>Performed feature engineering to extract a variety of features of different complexity levels</a:t>
             </a:r>
           </a:p>
           <a:p>
+            <a:pPr marL="342900" indent="-342900">
+              <a:buFont typeface="Arial" panose="020B0604020202020204" pitchFamily="34" charset="0"/>
+              <a:buChar char="•"/>
+            </a:pPr>
             <a:r>
-              <a:rPr lang="en-US" sz="2400" dirty="0"/>
+              <a:rPr lang="en-US" sz="2400" spc="-1" dirty="0">
+                <a:solidFill>
+                  <a:srgbClr val="808080"/>
+                </a:solidFill>
+                <a:latin typeface="Noto Sans"/>
+              </a:rPr>
               <a:t>Implemented prediction model based on ensemble of classifiers</a:t>
             </a:r>
           </a:p>
           <a:p>
+            <a:pPr marL="342900" indent="-342900">
+              <a:buFont typeface="Arial" panose="020B0604020202020204" pitchFamily="34" charset="0"/>
+              <a:buChar char="•"/>
+            </a:pPr>
             <a:r>
-              <a:rPr lang="en-US" sz="2400" dirty="0"/>
+              <a:rPr lang="en-US" sz="2400" spc="-1" dirty="0">
+                <a:solidFill>
+                  <a:srgbClr val="808080"/>
+                </a:solidFill>
+                <a:latin typeface="Noto Sans"/>
+              </a:rPr>
               <a:t>Submitted our solution on </a:t>
             </a:r>
             <a:r>
-              <a:rPr lang="en-US" sz="2400" dirty="0" err="1"/>
+              <a:rPr lang="en-US" sz="2400" spc="-1" dirty="0" err="1">
+                <a:solidFill>
+                  <a:srgbClr val="808080"/>
+                </a:solidFill>
+                <a:latin typeface="Noto Sans"/>
+              </a:rPr>
               <a:t>tianchi.aliyun.com</a:t>
             </a:r>
             <a:r>
-              <a:rPr lang="en-US" sz="2400" dirty="0"/>
+              <a:rPr lang="en-US" sz="2400" spc="-1" dirty="0">
+                <a:solidFill>
+                  <a:srgbClr val="808080"/>
+                </a:solidFill>
+                <a:latin typeface="Noto Sans"/>
+              </a:rPr>
               <a:t> and made it to the Top 40 Leaderboard!</a:t>
             </a:r>
           </a:p>
@@ -27443,6 +27767,235 @@
   <p:clrMapOvr>
     <a:masterClrMapping/>
   </p:clrMapOvr>
+  <p:timing>
+    <p:tnLst>
+      <p:par>
+        <p:cTn id="1" dur="indefinite" restart="never" nodeType="tmRoot">
+          <p:childTnLst>
+            <p:seq concurrent="1" nextAc="seek">
+              <p:cTn id="2" dur="indefinite" nodeType="mainSeq">
+                <p:childTnLst>
+                  <p:par>
+                    <p:cTn id="3" fill="hold">
+                      <p:stCondLst>
+                        <p:cond delay="indefinite"/>
+                      </p:stCondLst>
+                      <p:childTnLst>
+                        <p:par>
+                          <p:cTn id="4" fill="hold">
+                            <p:stCondLst>
+                              <p:cond delay="0"/>
+                            </p:stCondLst>
+                            <p:childTnLst>
+                              <p:par>
+                                <p:cTn id="5" presetID="1" presetClass="entr" presetSubtype="0" fill="hold" grpId="0" nodeType="clickEffect">
+                                  <p:stCondLst>
+                                    <p:cond delay="0"/>
+                                  </p:stCondLst>
+                                  <p:childTnLst>
+                                    <p:set>
+                                      <p:cBhvr>
+                                        <p:cTn id="6" dur="1" fill="hold">
+                                          <p:stCondLst>
+                                            <p:cond delay="0"/>
+                                          </p:stCondLst>
+                                        </p:cTn>
+                                        <p:tgtEl>
+                                          <p:spTgt spid="3">
+                                            <p:txEl>
+                                              <p:pRg st="0" end="0"/>
+                                            </p:txEl>
+                                          </p:spTgt>
+                                        </p:tgtEl>
+                                        <p:attrNameLst>
+                                          <p:attrName>style.visibility</p:attrName>
+                                        </p:attrNameLst>
+                                      </p:cBhvr>
+                                      <p:to>
+                                        <p:strVal val="visible"/>
+                                      </p:to>
+                                    </p:set>
+                                  </p:childTnLst>
+                                </p:cTn>
+                              </p:par>
+                            </p:childTnLst>
+                          </p:cTn>
+                        </p:par>
+                      </p:childTnLst>
+                    </p:cTn>
+                  </p:par>
+                  <p:par>
+                    <p:cTn id="7" fill="hold">
+                      <p:stCondLst>
+                        <p:cond delay="indefinite"/>
+                      </p:stCondLst>
+                      <p:childTnLst>
+                        <p:par>
+                          <p:cTn id="8" fill="hold">
+                            <p:stCondLst>
+                              <p:cond delay="0"/>
+                            </p:stCondLst>
+                            <p:childTnLst>
+                              <p:par>
+                                <p:cTn id="9" presetID="1" presetClass="entr" presetSubtype="0" fill="hold" grpId="0" nodeType="clickEffect">
+                                  <p:stCondLst>
+                                    <p:cond delay="0"/>
+                                  </p:stCondLst>
+                                  <p:childTnLst>
+                                    <p:set>
+                                      <p:cBhvr>
+                                        <p:cTn id="10" dur="1" fill="hold">
+                                          <p:stCondLst>
+                                            <p:cond delay="0"/>
+                                          </p:stCondLst>
+                                        </p:cTn>
+                                        <p:tgtEl>
+                                          <p:spTgt spid="3">
+                                            <p:txEl>
+                                              <p:pRg st="1" end="1"/>
+                                            </p:txEl>
+                                          </p:spTgt>
+                                        </p:tgtEl>
+                                        <p:attrNameLst>
+                                          <p:attrName>style.visibility</p:attrName>
+                                        </p:attrNameLst>
+                                      </p:cBhvr>
+                                      <p:to>
+                                        <p:strVal val="visible"/>
+                                      </p:to>
+                                    </p:set>
+                                  </p:childTnLst>
+                                </p:cTn>
+                              </p:par>
+                            </p:childTnLst>
+                          </p:cTn>
+                        </p:par>
+                      </p:childTnLst>
+                    </p:cTn>
+                  </p:par>
+                  <p:par>
+                    <p:cTn id="11" fill="hold">
+                      <p:stCondLst>
+                        <p:cond delay="indefinite"/>
+                      </p:stCondLst>
+                      <p:childTnLst>
+                        <p:par>
+                          <p:cTn id="12" fill="hold">
+                            <p:stCondLst>
+                              <p:cond delay="0"/>
+                            </p:stCondLst>
+                            <p:childTnLst>
+                              <p:par>
+                                <p:cTn id="13" presetID="1" presetClass="entr" presetSubtype="0" fill="hold" grpId="0" nodeType="clickEffect">
+                                  <p:stCondLst>
+                                    <p:cond delay="0"/>
+                                  </p:stCondLst>
+                                  <p:childTnLst>
+                                    <p:set>
+                                      <p:cBhvr>
+                                        <p:cTn id="14" dur="1" fill="hold">
+                                          <p:stCondLst>
+                                            <p:cond delay="0"/>
+                                          </p:stCondLst>
+                                        </p:cTn>
+                                        <p:tgtEl>
+                                          <p:spTgt spid="3">
+                                            <p:txEl>
+                                              <p:pRg st="2" end="2"/>
+                                            </p:txEl>
+                                          </p:spTgt>
+                                        </p:tgtEl>
+                                        <p:attrNameLst>
+                                          <p:attrName>style.visibility</p:attrName>
+                                        </p:attrNameLst>
+                                      </p:cBhvr>
+                                      <p:to>
+                                        <p:strVal val="visible"/>
+                                      </p:to>
+                                    </p:set>
+                                  </p:childTnLst>
+                                </p:cTn>
+                              </p:par>
+                            </p:childTnLst>
+                          </p:cTn>
+                        </p:par>
+                      </p:childTnLst>
+                    </p:cTn>
+                  </p:par>
+                  <p:par>
+                    <p:cTn id="15" fill="hold">
+                      <p:stCondLst>
+                        <p:cond delay="indefinite"/>
+                      </p:stCondLst>
+                      <p:childTnLst>
+                        <p:par>
+                          <p:cTn id="16" fill="hold">
+                            <p:stCondLst>
+                              <p:cond delay="0"/>
+                            </p:stCondLst>
+                            <p:childTnLst>
+                              <p:par>
+                                <p:cTn id="17" presetID="1" presetClass="entr" presetSubtype="0" fill="hold" grpId="0" nodeType="clickEffect">
+                                  <p:stCondLst>
+                                    <p:cond delay="0"/>
+                                  </p:stCondLst>
+                                  <p:childTnLst>
+                                    <p:set>
+                                      <p:cBhvr>
+                                        <p:cTn id="18" dur="1" fill="hold">
+                                          <p:stCondLst>
+                                            <p:cond delay="0"/>
+                                          </p:stCondLst>
+                                        </p:cTn>
+                                        <p:tgtEl>
+                                          <p:spTgt spid="3">
+                                            <p:txEl>
+                                              <p:pRg st="3" end="3"/>
+                                            </p:txEl>
+                                          </p:spTgt>
+                                        </p:tgtEl>
+                                        <p:attrNameLst>
+                                          <p:attrName>style.visibility</p:attrName>
+                                        </p:attrNameLst>
+                                      </p:cBhvr>
+                                      <p:to>
+                                        <p:strVal val="visible"/>
+                                      </p:to>
+                                    </p:set>
+                                  </p:childTnLst>
+                                </p:cTn>
+                              </p:par>
+                            </p:childTnLst>
+                          </p:cTn>
+                        </p:par>
+                      </p:childTnLst>
+                    </p:cTn>
+                  </p:par>
+                </p:childTnLst>
+              </p:cTn>
+              <p:prevCondLst>
+                <p:cond evt="onPrev" delay="0">
+                  <p:tgtEl>
+                    <p:sldTgt/>
+                  </p:tgtEl>
+                </p:cond>
+              </p:prevCondLst>
+              <p:nextCondLst>
+                <p:cond evt="onNext" delay="0">
+                  <p:tgtEl>
+                    <p:sldTgt/>
+                  </p:tgtEl>
+                </p:cond>
+              </p:nextCondLst>
+            </p:seq>
+          </p:childTnLst>
+        </p:cTn>
+      </p:par>
+    </p:tnLst>
+    <p:bldLst>
+      <p:bldP spid="3" grpId="0" build="p"/>
+    </p:bldLst>
+  </p:timing>
 </p:sld>
 </file>
 
@@ -28182,6 +28735,235 @@
   <p:clrMapOvr>
     <a:masterClrMapping/>
   </p:clrMapOvr>
+  <p:timing>
+    <p:tnLst>
+      <p:par>
+        <p:cTn id="1" dur="indefinite" restart="never" nodeType="tmRoot">
+          <p:childTnLst>
+            <p:seq concurrent="1" nextAc="seek">
+              <p:cTn id="2" dur="indefinite" nodeType="mainSeq">
+                <p:childTnLst>
+                  <p:par>
+                    <p:cTn id="3" fill="hold">
+                      <p:stCondLst>
+                        <p:cond delay="indefinite"/>
+                      </p:stCondLst>
+                      <p:childTnLst>
+                        <p:par>
+                          <p:cTn id="4" fill="hold">
+                            <p:stCondLst>
+                              <p:cond delay="0"/>
+                            </p:stCondLst>
+                            <p:childTnLst>
+                              <p:par>
+                                <p:cTn id="5" presetID="1" presetClass="entr" presetSubtype="0" fill="hold" grpId="0" nodeType="clickEffect">
+                                  <p:stCondLst>
+                                    <p:cond delay="0"/>
+                                  </p:stCondLst>
+                                  <p:childTnLst>
+                                    <p:set>
+                                      <p:cBhvr>
+                                        <p:cTn id="6" dur="1" fill="hold">
+                                          <p:stCondLst>
+                                            <p:cond delay="0"/>
+                                          </p:stCondLst>
+                                        </p:cTn>
+                                        <p:tgtEl>
+                                          <p:spTgt spid="3">
+                                            <p:txEl>
+                                              <p:pRg st="0" end="0"/>
+                                            </p:txEl>
+                                          </p:spTgt>
+                                        </p:tgtEl>
+                                        <p:attrNameLst>
+                                          <p:attrName>style.visibility</p:attrName>
+                                        </p:attrNameLst>
+                                      </p:cBhvr>
+                                      <p:to>
+                                        <p:strVal val="visible"/>
+                                      </p:to>
+                                    </p:set>
+                                  </p:childTnLst>
+                                </p:cTn>
+                              </p:par>
+                            </p:childTnLst>
+                          </p:cTn>
+                        </p:par>
+                      </p:childTnLst>
+                    </p:cTn>
+                  </p:par>
+                  <p:par>
+                    <p:cTn id="7" fill="hold">
+                      <p:stCondLst>
+                        <p:cond delay="indefinite"/>
+                      </p:stCondLst>
+                      <p:childTnLst>
+                        <p:par>
+                          <p:cTn id="8" fill="hold">
+                            <p:stCondLst>
+                              <p:cond delay="0"/>
+                            </p:stCondLst>
+                            <p:childTnLst>
+                              <p:par>
+                                <p:cTn id="9" presetID="1" presetClass="entr" presetSubtype="0" fill="hold" grpId="0" nodeType="clickEffect">
+                                  <p:stCondLst>
+                                    <p:cond delay="0"/>
+                                  </p:stCondLst>
+                                  <p:childTnLst>
+                                    <p:set>
+                                      <p:cBhvr>
+                                        <p:cTn id="10" dur="1" fill="hold">
+                                          <p:stCondLst>
+                                            <p:cond delay="0"/>
+                                          </p:stCondLst>
+                                        </p:cTn>
+                                        <p:tgtEl>
+                                          <p:spTgt spid="3">
+                                            <p:txEl>
+                                              <p:pRg st="1" end="1"/>
+                                            </p:txEl>
+                                          </p:spTgt>
+                                        </p:tgtEl>
+                                        <p:attrNameLst>
+                                          <p:attrName>style.visibility</p:attrName>
+                                        </p:attrNameLst>
+                                      </p:cBhvr>
+                                      <p:to>
+                                        <p:strVal val="visible"/>
+                                      </p:to>
+                                    </p:set>
+                                  </p:childTnLst>
+                                </p:cTn>
+                              </p:par>
+                            </p:childTnLst>
+                          </p:cTn>
+                        </p:par>
+                      </p:childTnLst>
+                    </p:cTn>
+                  </p:par>
+                  <p:par>
+                    <p:cTn id="11" fill="hold">
+                      <p:stCondLst>
+                        <p:cond delay="indefinite"/>
+                      </p:stCondLst>
+                      <p:childTnLst>
+                        <p:par>
+                          <p:cTn id="12" fill="hold">
+                            <p:stCondLst>
+                              <p:cond delay="0"/>
+                            </p:stCondLst>
+                            <p:childTnLst>
+                              <p:par>
+                                <p:cTn id="13" presetID="1" presetClass="entr" presetSubtype="0" fill="hold" grpId="0" nodeType="clickEffect">
+                                  <p:stCondLst>
+                                    <p:cond delay="0"/>
+                                  </p:stCondLst>
+                                  <p:childTnLst>
+                                    <p:set>
+                                      <p:cBhvr>
+                                        <p:cTn id="14" dur="1" fill="hold">
+                                          <p:stCondLst>
+                                            <p:cond delay="0"/>
+                                          </p:stCondLst>
+                                        </p:cTn>
+                                        <p:tgtEl>
+                                          <p:spTgt spid="3">
+                                            <p:txEl>
+                                              <p:pRg st="2" end="2"/>
+                                            </p:txEl>
+                                          </p:spTgt>
+                                        </p:tgtEl>
+                                        <p:attrNameLst>
+                                          <p:attrName>style.visibility</p:attrName>
+                                        </p:attrNameLst>
+                                      </p:cBhvr>
+                                      <p:to>
+                                        <p:strVal val="visible"/>
+                                      </p:to>
+                                    </p:set>
+                                  </p:childTnLst>
+                                </p:cTn>
+                              </p:par>
+                            </p:childTnLst>
+                          </p:cTn>
+                        </p:par>
+                      </p:childTnLst>
+                    </p:cTn>
+                  </p:par>
+                  <p:par>
+                    <p:cTn id="15" fill="hold">
+                      <p:stCondLst>
+                        <p:cond delay="indefinite"/>
+                      </p:stCondLst>
+                      <p:childTnLst>
+                        <p:par>
+                          <p:cTn id="16" fill="hold">
+                            <p:stCondLst>
+                              <p:cond delay="0"/>
+                            </p:stCondLst>
+                            <p:childTnLst>
+                              <p:par>
+                                <p:cTn id="17" presetID="1" presetClass="entr" presetSubtype="0" fill="hold" grpId="0" nodeType="clickEffect">
+                                  <p:stCondLst>
+                                    <p:cond delay="0"/>
+                                  </p:stCondLst>
+                                  <p:childTnLst>
+                                    <p:set>
+                                      <p:cBhvr>
+                                        <p:cTn id="18" dur="1" fill="hold">
+                                          <p:stCondLst>
+                                            <p:cond delay="0"/>
+                                          </p:stCondLst>
+                                        </p:cTn>
+                                        <p:tgtEl>
+                                          <p:spTgt spid="3">
+                                            <p:txEl>
+                                              <p:pRg st="3" end="3"/>
+                                            </p:txEl>
+                                          </p:spTgt>
+                                        </p:tgtEl>
+                                        <p:attrNameLst>
+                                          <p:attrName>style.visibility</p:attrName>
+                                        </p:attrNameLst>
+                                      </p:cBhvr>
+                                      <p:to>
+                                        <p:strVal val="visible"/>
+                                      </p:to>
+                                    </p:set>
+                                  </p:childTnLst>
+                                </p:cTn>
+                              </p:par>
+                            </p:childTnLst>
+                          </p:cTn>
+                        </p:par>
+                      </p:childTnLst>
+                    </p:cTn>
+                  </p:par>
+                </p:childTnLst>
+              </p:cTn>
+              <p:prevCondLst>
+                <p:cond evt="onPrev" delay="0">
+                  <p:tgtEl>
+                    <p:sldTgt/>
+                  </p:tgtEl>
+                </p:cond>
+              </p:prevCondLst>
+              <p:nextCondLst>
+                <p:cond evt="onNext" delay="0">
+                  <p:tgtEl>
+                    <p:sldTgt/>
+                  </p:tgtEl>
+                </p:cond>
+              </p:nextCondLst>
+            </p:seq>
+          </p:childTnLst>
+        </p:cTn>
+      </p:par>
+    </p:tnLst>
+    <p:bldLst>
+      <p:bldP spid="3" grpId="0" build="p"/>
+    </p:bldLst>
+  </p:timing>
 </p:sld>
 </file>
 
@@ -28398,6 +29180,235 @@
   <p:clrMapOvr>
     <a:masterClrMapping/>
   </p:clrMapOvr>
+  <p:timing>
+    <p:tnLst>
+      <p:par>
+        <p:cTn id="1" dur="indefinite" restart="never" nodeType="tmRoot">
+          <p:childTnLst>
+            <p:seq concurrent="1" nextAc="seek">
+              <p:cTn id="2" dur="indefinite" nodeType="mainSeq">
+                <p:childTnLst>
+                  <p:par>
+                    <p:cTn id="3" fill="hold">
+                      <p:stCondLst>
+                        <p:cond delay="indefinite"/>
+                      </p:stCondLst>
+                      <p:childTnLst>
+                        <p:par>
+                          <p:cTn id="4" fill="hold">
+                            <p:stCondLst>
+                              <p:cond delay="0"/>
+                            </p:stCondLst>
+                            <p:childTnLst>
+                              <p:par>
+                                <p:cTn id="5" presetID="1" presetClass="entr" presetSubtype="0" fill="hold" grpId="0" nodeType="clickEffect">
+                                  <p:stCondLst>
+                                    <p:cond delay="0"/>
+                                  </p:stCondLst>
+                                  <p:childTnLst>
+                                    <p:set>
+                                      <p:cBhvr>
+                                        <p:cTn id="6" dur="1" fill="hold">
+                                          <p:stCondLst>
+                                            <p:cond delay="0"/>
+                                          </p:stCondLst>
+                                        </p:cTn>
+                                        <p:tgtEl>
+                                          <p:spTgt spid="3">
+                                            <p:txEl>
+                                              <p:pRg st="0" end="0"/>
+                                            </p:txEl>
+                                          </p:spTgt>
+                                        </p:tgtEl>
+                                        <p:attrNameLst>
+                                          <p:attrName>style.visibility</p:attrName>
+                                        </p:attrNameLst>
+                                      </p:cBhvr>
+                                      <p:to>
+                                        <p:strVal val="visible"/>
+                                      </p:to>
+                                    </p:set>
+                                  </p:childTnLst>
+                                </p:cTn>
+                              </p:par>
+                            </p:childTnLst>
+                          </p:cTn>
+                        </p:par>
+                      </p:childTnLst>
+                    </p:cTn>
+                  </p:par>
+                  <p:par>
+                    <p:cTn id="7" fill="hold">
+                      <p:stCondLst>
+                        <p:cond delay="indefinite"/>
+                      </p:stCondLst>
+                      <p:childTnLst>
+                        <p:par>
+                          <p:cTn id="8" fill="hold">
+                            <p:stCondLst>
+                              <p:cond delay="0"/>
+                            </p:stCondLst>
+                            <p:childTnLst>
+                              <p:par>
+                                <p:cTn id="9" presetID="1" presetClass="entr" presetSubtype="0" fill="hold" grpId="0" nodeType="clickEffect">
+                                  <p:stCondLst>
+                                    <p:cond delay="0"/>
+                                  </p:stCondLst>
+                                  <p:childTnLst>
+                                    <p:set>
+                                      <p:cBhvr>
+                                        <p:cTn id="10" dur="1" fill="hold">
+                                          <p:stCondLst>
+                                            <p:cond delay="0"/>
+                                          </p:stCondLst>
+                                        </p:cTn>
+                                        <p:tgtEl>
+                                          <p:spTgt spid="3">
+                                            <p:txEl>
+                                              <p:pRg st="1" end="1"/>
+                                            </p:txEl>
+                                          </p:spTgt>
+                                        </p:tgtEl>
+                                        <p:attrNameLst>
+                                          <p:attrName>style.visibility</p:attrName>
+                                        </p:attrNameLst>
+                                      </p:cBhvr>
+                                      <p:to>
+                                        <p:strVal val="visible"/>
+                                      </p:to>
+                                    </p:set>
+                                  </p:childTnLst>
+                                </p:cTn>
+                              </p:par>
+                            </p:childTnLst>
+                          </p:cTn>
+                        </p:par>
+                      </p:childTnLst>
+                    </p:cTn>
+                  </p:par>
+                  <p:par>
+                    <p:cTn id="11" fill="hold">
+                      <p:stCondLst>
+                        <p:cond delay="indefinite"/>
+                      </p:stCondLst>
+                      <p:childTnLst>
+                        <p:par>
+                          <p:cTn id="12" fill="hold">
+                            <p:stCondLst>
+                              <p:cond delay="0"/>
+                            </p:stCondLst>
+                            <p:childTnLst>
+                              <p:par>
+                                <p:cTn id="13" presetID="1" presetClass="entr" presetSubtype="0" fill="hold" grpId="0" nodeType="clickEffect">
+                                  <p:stCondLst>
+                                    <p:cond delay="0"/>
+                                  </p:stCondLst>
+                                  <p:childTnLst>
+                                    <p:set>
+                                      <p:cBhvr>
+                                        <p:cTn id="14" dur="1" fill="hold">
+                                          <p:stCondLst>
+                                            <p:cond delay="0"/>
+                                          </p:stCondLst>
+                                        </p:cTn>
+                                        <p:tgtEl>
+                                          <p:spTgt spid="3">
+                                            <p:txEl>
+                                              <p:pRg st="2" end="2"/>
+                                            </p:txEl>
+                                          </p:spTgt>
+                                        </p:tgtEl>
+                                        <p:attrNameLst>
+                                          <p:attrName>style.visibility</p:attrName>
+                                        </p:attrNameLst>
+                                      </p:cBhvr>
+                                      <p:to>
+                                        <p:strVal val="visible"/>
+                                      </p:to>
+                                    </p:set>
+                                  </p:childTnLst>
+                                </p:cTn>
+                              </p:par>
+                            </p:childTnLst>
+                          </p:cTn>
+                        </p:par>
+                      </p:childTnLst>
+                    </p:cTn>
+                  </p:par>
+                  <p:par>
+                    <p:cTn id="15" fill="hold">
+                      <p:stCondLst>
+                        <p:cond delay="indefinite"/>
+                      </p:stCondLst>
+                      <p:childTnLst>
+                        <p:par>
+                          <p:cTn id="16" fill="hold">
+                            <p:stCondLst>
+                              <p:cond delay="0"/>
+                            </p:stCondLst>
+                            <p:childTnLst>
+                              <p:par>
+                                <p:cTn id="17" presetID="1" presetClass="entr" presetSubtype="0" fill="hold" grpId="0" nodeType="clickEffect">
+                                  <p:stCondLst>
+                                    <p:cond delay="0"/>
+                                  </p:stCondLst>
+                                  <p:childTnLst>
+                                    <p:set>
+                                      <p:cBhvr>
+                                        <p:cTn id="18" dur="1" fill="hold">
+                                          <p:stCondLst>
+                                            <p:cond delay="0"/>
+                                          </p:stCondLst>
+                                        </p:cTn>
+                                        <p:tgtEl>
+                                          <p:spTgt spid="3">
+                                            <p:txEl>
+                                              <p:pRg st="3" end="3"/>
+                                            </p:txEl>
+                                          </p:spTgt>
+                                        </p:tgtEl>
+                                        <p:attrNameLst>
+                                          <p:attrName>style.visibility</p:attrName>
+                                        </p:attrNameLst>
+                                      </p:cBhvr>
+                                      <p:to>
+                                        <p:strVal val="visible"/>
+                                      </p:to>
+                                    </p:set>
+                                  </p:childTnLst>
+                                </p:cTn>
+                              </p:par>
+                            </p:childTnLst>
+                          </p:cTn>
+                        </p:par>
+                      </p:childTnLst>
+                    </p:cTn>
+                  </p:par>
+                </p:childTnLst>
+              </p:cTn>
+              <p:prevCondLst>
+                <p:cond evt="onPrev" delay="0">
+                  <p:tgtEl>
+                    <p:sldTgt/>
+                  </p:tgtEl>
+                </p:cond>
+              </p:prevCondLst>
+              <p:nextCondLst>
+                <p:cond evt="onNext" delay="0">
+                  <p:tgtEl>
+                    <p:sldTgt/>
+                  </p:tgtEl>
+                </p:cond>
+              </p:nextCondLst>
+            </p:seq>
+          </p:childTnLst>
+        </p:cTn>
+      </p:par>
+    </p:tnLst>
+    <p:bldLst>
+      <p:bldP spid="3" grpId="0" build="p"/>
+    </p:bldLst>
+  </p:timing>
 </p:sld>
 </file>
 
@@ -28752,6 +29763,248 @@
   <p:clrMapOvr>
     <a:masterClrMapping/>
   </p:clrMapOvr>
+  <p:timing>
+    <p:tnLst>
+      <p:par>
+        <p:cTn id="1" dur="indefinite" restart="never" nodeType="tmRoot">
+          <p:childTnLst>
+            <p:seq concurrent="1" nextAc="seek">
+              <p:cTn id="2" dur="indefinite" nodeType="mainSeq">
+                <p:childTnLst>
+                  <p:par>
+                    <p:cTn id="3" fill="hold">
+                      <p:stCondLst>
+                        <p:cond delay="indefinite"/>
+                      </p:stCondLst>
+                      <p:childTnLst>
+                        <p:par>
+                          <p:cTn id="4" fill="hold">
+                            <p:stCondLst>
+                              <p:cond delay="0"/>
+                            </p:stCondLst>
+                            <p:childTnLst>
+                              <p:par>
+                                <p:cTn id="5" presetID="1" presetClass="entr" presetSubtype="0" fill="hold" grpId="0" nodeType="clickEffect">
+                                  <p:stCondLst>
+                                    <p:cond delay="0"/>
+                                  </p:stCondLst>
+                                  <p:childTnLst>
+                                    <p:set>
+                                      <p:cBhvr>
+                                        <p:cTn id="6" dur="1" fill="hold">
+                                          <p:stCondLst>
+                                            <p:cond delay="0"/>
+                                          </p:stCondLst>
+                                        </p:cTn>
+                                        <p:tgtEl>
+                                          <p:spTgt spid="8">
+                                            <p:txEl>
+                                              <p:pRg st="0" end="0"/>
+                                            </p:txEl>
+                                          </p:spTgt>
+                                        </p:tgtEl>
+                                        <p:attrNameLst>
+                                          <p:attrName>style.visibility</p:attrName>
+                                        </p:attrNameLst>
+                                      </p:cBhvr>
+                                      <p:to>
+                                        <p:strVal val="visible"/>
+                                      </p:to>
+                                    </p:set>
+                                  </p:childTnLst>
+                                </p:cTn>
+                              </p:par>
+                            </p:childTnLst>
+                          </p:cTn>
+                        </p:par>
+                      </p:childTnLst>
+                    </p:cTn>
+                  </p:par>
+                  <p:par>
+                    <p:cTn id="7" fill="hold">
+                      <p:stCondLst>
+                        <p:cond delay="indefinite"/>
+                      </p:stCondLst>
+                      <p:childTnLst>
+                        <p:par>
+                          <p:cTn id="8" fill="hold">
+                            <p:stCondLst>
+                              <p:cond delay="0"/>
+                            </p:stCondLst>
+                            <p:childTnLst>
+                              <p:par>
+                                <p:cTn id="9" presetID="1" presetClass="entr" presetSubtype="0" fill="hold" grpId="0" nodeType="clickEffect">
+                                  <p:stCondLst>
+                                    <p:cond delay="0"/>
+                                  </p:stCondLst>
+                                  <p:childTnLst>
+                                    <p:set>
+                                      <p:cBhvr>
+                                        <p:cTn id="10" dur="1" fill="hold">
+                                          <p:stCondLst>
+                                            <p:cond delay="0"/>
+                                          </p:stCondLst>
+                                        </p:cTn>
+                                        <p:tgtEl>
+                                          <p:spTgt spid="8">
+                                            <p:txEl>
+                                              <p:pRg st="1" end="1"/>
+                                            </p:txEl>
+                                          </p:spTgt>
+                                        </p:tgtEl>
+                                        <p:attrNameLst>
+                                          <p:attrName>style.visibility</p:attrName>
+                                        </p:attrNameLst>
+                                      </p:cBhvr>
+                                      <p:to>
+                                        <p:strVal val="visible"/>
+                                      </p:to>
+                                    </p:set>
+                                  </p:childTnLst>
+                                </p:cTn>
+                              </p:par>
+                            </p:childTnLst>
+                          </p:cTn>
+                        </p:par>
+                      </p:childTnLst>
+                    </p:cTn>
+                  </p:par>
+                  <p:par>
+                    <p:cTn id="11" fill="hold">
+                      <p:stCondLst>
+                        <p:cond delay="indefinite"/>
+                      </p:stCondLst>
+                      <p:childTnLst>
+                        <p:par>
+                          <p:cTn id="12" fill="hold">
+                            <p:stCondLst>
+                              <p:cond delay="0"/>
+                            </p:stCondLst>
+                            <p:childTnLst>
+                              <p:par>
+                                <p:cTn id="13" presetID="1" presetClass="entr" presetSubtype="0" fill="hold" grpId="0" nodeType="clickEffect">
+                                  <p:stCondLst>
+                                    <p:cond delay="0"/>
+                                  </p:stCondLst>
+                                  <p:childTnLst>
+                                    <p:set>
+                                      <p:cBhvr>
+                                        <p:cTn id="14" dur="1" fill="hold">
+                                          <p:stCondLst>
+                                            <p:cond delay="0"/>
+                                          </p:stCondLst>
+                                        </p:cTn>
+                                        <p:tgtEl>
+                                          <p:spTgt spid="8">
+                                            <p:txEl>
+                                              <p:pRg st="2" end="2"/>
+                                            </p:txEl>
+                                          </p:spTgt>
+                                        </p:tgtEl>
+                                        <p:attrNameLst>
+                                          <p:attrName>style.visibility</p:attrName>
+                                        </p:attrNameLst>
+                                      </p:cBhvr>
+                                      <p:to>
+                                        <p:strVal val="visible"/>
+                                      </p:to>
+                                    </p:set>
+                                  </p:childTnLst>
+                                </p:cTn>
+                              </p:par>
+                              <p:par>
+                                <p:cTn id="15" presetID="1" presetClass="entr" presetSubtype="0" fill="hold" grpId="0" nodeType="withEffect">
+                                  <p:stCondLst>
+                                    <p:cond delay="0"/>
+                                  </p:stCondLst>
+                                  <p:childTnLst>
+                                    <p:set>
+                                      <p:cBhvr>
+                                        <p:cTn id="16" dur="1" fill="hold">
+                                          <p:stCondLst>
+                                            <p:cond delay="0"/>
+                                          </p:stCondLst>
+                                        </p:cTn>
+                                        <p:tgtEl>
+                                          <p:spTgt spid="8">
+                                            <p:txEl>
+                                              <p:pRg st="3" end="3"/>
+                                            </p:txEl>
+                                          </p:spTgt>
+                                        </p:tgtEl>
+                                        <p:attrNameLst>
+                                          <p:attrName>style.visibility</p:attrName>
+                                        </p:attrNameLst>
+                                      </p:cBhvr>
+                                      <p:to>
+                                        <p:strVal val="visible"/>
+                                      </p:to>
+                                    </p:set>
+                                  </p:childTnLst>
+                                </p:cTn>
+                              </p:par>
+                              <p:par>
+                                <p:cTn id="17" presetID="1" presetClass="entr" presetSubtype="0" fill="hold" grpId="0" nodeType="withEffect">
+                                  <p:stCondLst>
+                                    <p:cond delay="0"/>
+                                  </p:stCondLst>
+                                  <p:childTnLst>
+                                    <p:set>
+                                      <p:cBhvr>
+                                        <p:cTn id="18" dur="1" fill="hold">
+                                          <p:stCondLst>
+                                            <p:cond delay="0"/>
+                                          </p:stCondLst>
+                                        </p:cTn>
+                                        <p:tgtEl>
+                                          <p:spTgt spid="8">
+                                            <p:txEl>
+                                              <p:pRg st="4" end="4"/>
+                                            </p:txEl>
+                                          </p:spTgt>
+                                        </p:tgtEl>
+                                        <p:attrNameLst>
+                                          <p:attrName>style.visibility</p:attrName>
+                                        </p:attrNameLst>
+                                      </p:cBhvr>
+                                      <p:to>
+                                        <p:strVal val="visible"/>
+                                      </p:to>
+                                    </p:set>
+                                  </p:childTnLst>
+                                </p:cTn>
+                              </p:par>
+                            </p:childTnLst>
+                          </p:cTn>
+                        </p:par>
+                      </p:childTnLst>
+                    </p:cTn>
+                  </p:par>
+                </p:childTnLst>
+              </p:cTn>
+              <p:prevCondLst>
+                <p:cond evt="onPrev" delay="0">
+                  <p:tgtEl>
+                    <p:sldTgt/>
+                  </p:tgtEl>
+                </p:cond>
+              </p:prevCondLst>
+              <p:nextCondLst>
+                <p:cond evt="onNext" delay="0">
+                  <p:tgtEl>
+                    <p:sldTgt/>
+                  </p:tgtEl>
+                </p:cond>
+              </p:nextCondLst>
+            </p:seq>
+          </p:childTnLst>
+        </p:cTn>
+      </p:par>
+    </p:tnLst>
+    <p:bldLst>
+      <p:bldP spid="8" grpId="0" build="p"/>
+    </p:bldLst>
+  </p:timing>
 </p:sld>
 </file>
 
@@ -28975,6 +30228,235 @@
   <p:clrMapOvr>
     <a:masterClrMapping/>
   </p:clrMapOvr>
+  <p:timing>
+    <p:tnLst>
+      <p:par>
+        <p:cTn id="1" dur="indefinite" restart="never" nodeType="tmRoot">
+          <p:childTnLst>
+            <p:seq concurrent="1" nextAc="seek">
+              <p:cTn id="2" dur="indefinite" nodeType="mainSeq">
+                <p:childTnLst>
+                  <p:par>
+                    <p:cTn id="3" fill="hold">
+                      <p:stCondLst>
+                        <p:cond delay="indefinite"/>
+                      </p:stCondLst>
+                      <p:childTnLst>
+                        <p:par>
+                          <p:cTn id="4" fill="hold">
+                            <p:stCondLst>
+                              <p:cond delay="0"/>
+                            </p:stCondLst>
+                            <p:childTnLst>
+                              <p:par>
+                                <p:cTn id="5" presetID="1" presetClass="entr" presetSubtype="0" fill="hold" grpId="0" nodeType="clickEffect">
+                                  <p:stCondLst>
+                                    <p:cond delay="0"/>
+                                  </p:stCondLst>
+                                  <p:childTnLst>
+                                    <p:set>
+                                      <p:cBhvr>
+                                        <p:cTn id="6" dur="1" fill="hold">
+                                          <p:stCondLst>
+                                            <p:cond delay="0"/>
+                                          </p:stCondLst>
+                                        </p:cTn>
+                                        <p:tgtEl>
+                                          <p:spTgt spid="5">
+                                            <p:txEl>
+                                              <p:pRg st="0" end="0"/>
+                                            </p:txEl>
+                                          </p:spTgt>
+                                        </p:tgtEl>
+                                        <p:attrNameLst>
+                                          <p:attrName>style.visibility</p:attrName>
+                                        </p:attrNameLst>
+                                      </p:cBhvr>
+                                      <p:to>
+                                        <p:strVal val="visible"/>
+                                      </p:to>
+                                    </p:set>
+                                  </p:childTnLst>
+                                </p:cTn>
+                              </p:par>
+                            </p:childTnLst>
+                          </p:cTn>
+                        </p:par>
+                      </p:childTnLst>
+                    </p:cTn>
+                  </p:par>
+                  <p:par>
+                    <p:cTn id="7" fill="hold">
+                      <p:stCondLst>
+                        <p:cond delay="indefinite"/>
+                      </p:stCondLst>
+                      <p:childTnLst>
+                        <p:par>
+                          <p:cTn id="8" fill="hold">
+                            <p:stCondLst>
+                              <p:cond delay="0"/>
+                            </p:stCondLst>
+                            <p:childTnLst>
+                              <p:par>
+                                <p:cTn id="9" presetID="1" presetClass="entr" presetSubtype="0" fill="hold" grpId="0" nodeType="clickEffect">
+                                  <p:stCondLst>
+                                    <p:cond delay="0"/>
+                                  </p:stCondLst>
+                                  <p:childTnLst>
+                                    <p:set>
+                                      <p:cBhvr>
+                                        <p:cTn id="10" dur="1" fill="hold">
+                                          <p:stCondLst>
+                                            <p:cond delay="0"/>
+                                          </p:stCondLst>
+                                        </p:cTn>
+                                        <p:tgtEl>
+                                          <p:spTgt spid="5">
+                                            <p:txEl>
+                                              <p:pRg st="1" end="1"/>
+                                            </p:txEl>
+                                          </p:spTgt>
+                                        </p:tgtEl>
+                                        <p:attrNameLst>
+                                          <p:attrName>style.visibility</p:attrName>
+                                        </p:attrNameLst>
+                                      </p:cBhvr>
+                                      <p:to>
+                                        <p:strVal val="visible"/>
+                                      </p:to>
+                                    </p:set>
+                                  </p:childTnLst>
+                                </p:cTn>
+                              </p:par>
+                            </p:childTnLst>
+                          </p:cTn>
+                        </p:par>
+                      </p:childTnLst>
+                    </p:cTn>
+                  </p:par>
+                  <p:par>
+                    <p:cTn id="11" fill="hold">
+                      <p:stCondLst>
+                        <p:cond delay="indefinite"/>
+                      </p:stCondLst>
+                      <p:childTnLst>
+                        <p:par>
+                          <p:cTn id="12" fill="hold">
+                            <p:stCondLst>
+                              <p:cond delay="0"/>
+                            </p:stCondLst>
+                            <p:childTnLst>
+                              <p:par>
+                                <p:cTn id="13" presetID="1" presetClass="entr" presetSubtype="0" fill="hold" grpId="0" nodeType="clickEffect">
+                                  <p:stCondLst>
+                                    <p:cond delay="0"/>
+                                  </p:stCondLst>
+                                  <p:childTnLst>
+                                    <p:set>
+                                      <p:cBhvr>
+                                        <p:cTn id="14" dur="1" fill="hold">
+                                          <p:stCondLst>
+                                            <p:cond delay="0"/>
+                                          </p:stCondLst>
+                                        </p:cTn>
+                                        <p:tgtEl>
+                                          <p:spTgt spid="5">
+                                            <p:txEl>
+                                              <p:pRg st="2" end="2"/>
+                                            </p:txEl>
+                                          </p:spTgt>
+                                        </p:tgtEl>
+                                        <p:attrNameLst>
+                                          <p:attrName>style.visibility</p:attrName>
+                                        </p:attrNameLst>
+                                      </p:cBhvr>
+                                      <p:to>
+                                        <p:strVal val="visible"/>
+                                      </p:to>
+                                    </p:set>
+                                  </p:childTnLst>
+                                </p:cTn>
+                              </p:par>
+                            </p:childTnLst>
+                          </p:cTn>
+                        </p:par>
+                      </p:childTnLst>
+                    </p:cTn>
+                  </p:par>
+                  <p:par>
+                    <p:cTn id="15" fill="hold">
+                      <p:stCondLst>
+                        <p:cond delay="indefinite"/>
+                      </p:stCondLst>
+                      <p:childTnLst>
+                        <p:par>
+                          <p:cTn id="16" fill="hold">
+                            <p:stCondLst>
+                              <p:cond delay="0"/>
+                            </p:stCondLst>
+                            <p:childTnLst>
+                              <p:par>
+                                <p:cTn id="17" presetID="1" presetClass="entr" presetSubtype="0" fill="hold" grpId="0" nodeType="clickEffect">
+                                  <p:stCondLst>
+                                    <p:cond delay="0"/>
+                                  </p:stCondLst>
+                                  <p:childTnLst>
+                                    <p:set>
+                                      <p:cBhvr>
+                                        <p:cTn id="18" dur="1" fill="hold">
+                                          <p:stCondLst>
+                                            <p:cond delay="0"/>
+                                          </p:stCondLst>
+                                        </p:cTn>
+                                        <p:tgtEl>
+                                          <p:spTgt spid="5">
+                                            <p:txEl>
+                                              <p:pRg st="3" end="3"/>
+                                            </p:txEl>
+                                          </p:spTgt>
+                                        </p:tgtEl>
+                                        <p:attrNameLst>
+                                          <p:attrName>style.visibility</p:attrName>
+                                        </p:attrNameLst>
+                                      </p:cBhvr>
+                                      <p:to>
+                                        <p:strVal val="visible"/>
+                                      </p:to>
+                                    </p:set>
+                                  </p:childTnLst>
+                                </p:cTn>
+                              </p:par>
+                            </p:childTnLst>
+                          </p:cTn>
+                        </p:par>
+                      </p:childTnLst>
+                    </p:cTn>
+                  </p:par>
+                </p:childTnLst>
+              </p:cTn>
+              <p:prevCondLst>
+                <p:cond evt="onPrev" delay="0">
+                  <p:tgtEl>
+                    <p:sldTgt/>
+                  </p:tgtEl>
+                </p:cond>
+              </p:prevCondLst>
+              <p:nextCondLst>
+                <p:cond evt="onNext" delay="0">
+                  <p:tgtEl>
+                    <p:sldTgt/>
+                  </p:tgtEl>
+                </p:cond>
+              </p:nextCondLst>
+            </p:seq>
+          </p:childTnLst>
+        </p:cTn>
+      </p:par>
+    </p:tnLst>
+    <p:bldLst>
+      <p:bldP spid="5" grpId="0" build="p"/>
+    </p:bldLst>
+  </p:timing>
 </p:sld>
 </file>
 

</xml_diff>